<commit_message>
[docs] Update project role S04P31A201-42
</commit_message>
<xml_diff>
--- a/docs/Introduce/SDS_자기소개_전원표.pptx
+++ b/docs/Introduce/SDS_자기소개_전원표.pptx
@@ -5440,7 +5440,7 @@
         </p:nvSpPr>
         <p:spPr>
           <a:xfrm>
-            <a:off x="1025234" y="2989812"/>
+            <a:off x="1025234" y="3071420"/>
             <a:ext cx="1884219" cy="429491"/>
           </a:xfrm>
           <a:prstGeom prst="roundRect">
@@ -5489,7 +5489,7 @@
         </p:nvSpPr>
         <p:spPr>
           <a:xfrm>
-            <a:off x="1025235" y="4337862"/>
+            <a:off x="1025235" y="4071586"/>
             <a:ext cx="1884219" cy="429491"/>
           </a:xfrm>
           <a:prstGeom prst="roundRect">
@@ -5525,7 +5525,7 @@
             <a:pPr algn="ctr"/>
             <a:r>
               <a:rPr lang="ko-KR" altLang="en-US" sz="1600" b="1" dirty="0"/>
-              <a:t>세부 내용</a:t>
+              <a:t>담당 역할</a:t>
             </a:r>
           </a:p>
         </p:txBody>
@@ -5580,7 +5580,7 @@
         </p:nvSpPr>
         <p:spPr>
           <a:xfrm>
-            <a:off x="3117448" y="3019891"/>
+            <a:off x="3117448" y="3071420"/>
             <a:ext cx="3882794" cy="646331"/>
           </a:xfrm>
           <a:prstGeom prst="rect">
@@ -5631,8 +5631,8 @@
         </p:nvSpPr>
         <p:spPr>
           <a:xfrm>
-            <a:off x="3117447" y="4367941"/>
-            <a:ext cx="4012557" cy="923330"/>
+            <a:off x="3117447" y="4071586"/>
+            <a:ext cx="4012557" cy="646331"/>
           </a:xfrm>
           <a:prstGeom prst="rect">
             <a:avLst/>
@@ -5645,42 +5645,59 @@
           </a:bodyPr>
           <a:lstStyle/>
           <a:p>
-            <a:pPr marL="285750" indent="-285750">
-              <a:buFontTx/>
-              <a:buChar char="-"/>
-            </a:pPr>
-            <a:r>
-              <a:rPr lang="en-US" altLang="ko-KR" dirty="0"/>
-              <a:t>Spring + Vue + MySQL</a:t>
-            </a:r>
-          </a:p>
-          <a:p>
-            <a:pPr marL="285750" indent="-285750">
-              <a:buFontTx/>
-              <a:buChar char="-"/>
-            </a:pPr>
-            <a:r>
-              <a:rPr lang="en-US" altLang="ko-KR" dirty="0"/>
-              <a:t>JWT + </a:t>
-            </a:r>
-            <a:r>
-              <a:rPr lang="en-US" altLang="ko-KR" dirty="0" err="1"/>
-              <a:t>Websocket</a:t>
-            </a:r>
-            <a:r>
-              <a:rPr lang="en-US" altLang="ko-KR" dirty="0"/>
-              <a:t> + Redis</a:t>
-            </a:r>
-          </a:p>
-          <a:p>
-            <a:pPr marL="285750" indent="-285750">
-              <a:buFontTx/>
-              <a:buChar char="-"/>
-            </a:pPr>
-            <a:r>
-              <a:rPr lang="en-US" altLang="ko-KR" dirty="0"/>
-              <a:t>Docker</a:t>
-            </a:r>
+            <a:r>
+              <a:rPr lang="ko-KR" altLang="en-US" dirty="0">
+                <a:solidFill>
+                  <a:srgbClr val="000000"/>
+                </a:solidFill>
+                <a:effectLst/>
+                <a:latin typeface="+mn-ea"/>
+              </a:rPr>
+              <a:t>회원 인증</a:t>
+            </a:r>
+            <a:r>
+              <a:rPr lang="en-US" altLang="ko-KR" dirty="0">
+                <a:solidFill>
+                  <a:srgbClr val="000000"/>
+                </a:solidFill>
+                <a:effectLst/>
+                <a:latin typeface="+mn-ea"/>
+              </a:rPr>
+              <a:t>, </a:t>
+            </a:r>
+            <a:r>
+              <a:rPr lang="ko-KR" altLang="en-US" dirty="0">
+                <a:solidFill>
+                  <a:srgbClr val="000000"/>
+                </a:solidFill>
+                <a:effectLst/>
+                <a:latin typeface="+mn-ea"/>
+              </a:rPr>
+              <a:t>실시간 채팅 및 경매 기능</a:t>
+            </a:r>
+            <a:r>
+              <a:rPr lang="en-US" altLang="ko-KR" dirty="0">
+                <a:solidFill>
+                  <a:srgbClr val="000000"/>
+                </a:solidFill>
+                <a:effectLst/>
+                <a:latin typeface="+mn-ea"/>
+              </a:rPr>
+              <a:t>, </a:t>
+            </a:r>
+            <a:r>
+              <a:rPr lang="ko-KR" altLang="en-US" dirty="0">
+                <a:solidFill>
+                  <a:srgbClr val="000000"/>
+                </a:solidFill>
+                <a:effectLst/>
+                <a:latin typeface="+mn-ea"/>
+              </a:rPr>
+              <a:t>서비스 배포 관리</a:t>
+            </a:r>
+            <a:endParaRPr lang="en-US" altLang="ko-KR" dirty="0">
+              <a:latin typeface="+mn-ea"/>
+            </a:endParaRPr>
           </a:p>
         </p:txBody>
       </p:sp>
@@ -5713,7 +5730,7 @@
         </p:blipFill>
         <p:spPr bwMode="auto">
           <a:xfrm>
-            <a:off x="7072545" y="1559444"/>
+            <a:off x="7516243" y="1559444"/>
             <a:ext cx="4140000" cy="2271573"/>
           </a:xfrm>
           <a:prstGeom prst="rect">
@@ -5753,7 +5770,7 @@
         </p:blipFill>
         <p:spPr>
           <a:xfrm>
-            <a:off x="7072545" y="3831017"/>
+            <a:off x="7516243" y="3831017"/>
             <a:ext cx="4140000" cy="2639693"/>
           </a:xfrm>
           <a:prstGeom prst="rect">
@@ -5761,6 +5778,233 @@
           </a:prstGeom>
         </p:spPr>
       </p:pic>
+      <p:sp>
+        <p:nvSpPr>
+          <p:cNvPr id="13" name="모서리가 둥근 직사각형 39">
+            <a:extLst>
+              <a:ext uri="{FF2B5EF4-FFF2-40B4-BE49-F238E27FC236}">
+                <a16:creationId xmlns:a16="http://schemas.microsoft.com/office/drawing/2014/main" id="{15E3D04E-C52F-4D3E-8172-A7DB76E39F0B}"/>
+              </a:ext>
+            </a:extLst>
+          </p:cNvPr>
+          <p:cNvSpPr/>
+          <p:nvPr/>
+        </p:nvSpPr>
+        <p:spPr>
+          <a:xfrm>
+            <a:off x="1025235" y="5071753"/>
+            <a:ext cx="1884219" cy="429491"/>
+          </a:xfrm>
+          <a:prstGeom prst="roundRect">
+            <a:avLst/>
+          </a:prstGeom>
+          <a:solidFill>
+            <a:srgbClr val="00B050"/>
+          </a:solidFill>
+          <a:ln>
+            <a:noFill/>
+          </a:ln>
+        </p:spPr>
+        <p:style>
+          <a:lnRef idx="2">
+            <a:schemeClr val="accent1">
+              <a:shade val="50000"/>
+            </a:schemeClr>
+          </a:lnRef>
+          <a:fillRef idx="1">
+            <a:schemeClr val="accent1"/>
+          </a:fillRef>
+          <a:effectRef idx="0">
+            <a:schemeClr val="accent1"/>
+          </a:effectRef>
+          <a:fontRef idx="minor">
+            <a:schemeClr val="lt1"/>
+          </a:fontRef>
+        </p:style>
+        <p:txBody>
+          <a:bodyPr rtlCol="0" anchor="ctr"/>
+          <a:lstStyle/>
+          <a:p>
+            <a:pPr algn="ctr"/>
+            <a:r>
+              <a:rPr lang="ko-KR" altLang="en-US" sz="1600" b="1" dirty="0"/>
+              <a:t>개발 내용</a:t>
+            </a:r>
+          </a:p>
+        </p:txBody>
+      </p:sp>
+      <p:sp>
+        <p:nvSpPr>
+          <p:cNvPr id="14" name="TextBox 13">
+            <a:extLst>
+              <a:ext uri="{FF2B5EF4-FFF2-40B4-BE49-F238E27FC236}">
+                <a16:creationId xmlns:a16="http://schemas.microsoft.com/office/drawing/2014/main" id="{FE8AD20A-5A66-4A45-83B3-401075B850DC}"/>
+              </a:ext>
+            </a:extLst>
+          </p:cNvPr>
+          <p:cNvSpPr txBox="1"/>
+          <p:nvPr/>
+        </p:nvSpPr>
+        <p:spPr>
+          <a:xfrm>
+            <a:off x="3117447" y="5071752"/>
+            <a:ext cx="4398796" cy="1169551"/>
+          </a:xfrm>
+          <a:prstGeom prst="rect">
+            <a:avLst/>
+          </a:prstGeom>
+          <a:noFill/>
+        </p:spPr>
+        <p:txBody>
+          <a:bodyPr wrap="square" rtlCol="0">
+            <a:spAutoFit/>
+          </a:bodyPr>
+          <a:lstStyle/>
+          <a:p>
+            <a:r>
+              <a:rPr lang="en-US" altLang="ko-KR" sz="1400" dirty="0">
+                <a:solidFill>
+                  <a:srgbClr val="000000"/>
+                </a:solidFill>
+                <a:effectLst/>
+                <a:latin typeface="+mn-ea"/>
+              </a:rPr>
+              <a:t>- Vue.js</a:t>
+            </a:r>
+            <a:r>
+              <a:rPr lang="ko-KR" altLang="en-US" sz="1400" dirty="0">
+                <a:solidFill>
+                  <a:srgbClr val="000000"/>
+                </a:solidFill>
+                <a:effectLst/>
+                <a:latin typeface="+mn-ea"/>
+              </a:rPr>
+              <a:t>를 통한 반응형 웹 어플리케이션 구현</a:t>
+            </a:r>
+          </a:p>
+          <a:p>
+            <a:r>
+              <a:rPr lang="en-US" altLang="ko-KR" sz="1400" dirty="0">
+                <a:solidFill>
+                  <a:srgbClr val="000000"/>
+                </a:solidFill>
+                <a:effectLst/>
+                <a:latin typeface="+mn-ea"/>
+              </a:rPr>
+              <a:t>- JWT</a:t>
+            </a:r>
+            <a:r>
+              <a:rPr lang="ko-KR" altLang="en-US" sz="1400" dirty="0">
+                <a:solidFill>
+                  <a:srgbClr val="000000"/>
+                </a:solidFill>
+                <a:effectLst/>
+                <a:latin typeface="+mn-ea"/>
+              </a:rPr>
+              <a:t>를 통한 회원 인증</a:t>
+            </a:r>
+          </a:p>
+          <a:p>
+            <a:r>
+              <a:rPr lang="en-US" altLang="ko-KR" sz="1400" dirty="0">
+                <a:solidFill>
+                  <a:srgbClr val="000000"/>
+                </a:solidFill>
+                <a:effectLst/>
+                <a:latin typeface="+mn-ea"/>
+              </a:rPr>
+              <a:t>- </a:t>
+            </a:r>
+            <a:r>
+              <a:rPr lang="en-US" altLang="ko-KR" sz="1400" dirty="0" err="1">
+                <a:solidFill>
+                  <a:srgbClr val="000000"/>
+                </a:solidFill>
+                <a:effectLst/>
+                <a:latin typeface="+mn-ea"/>
+              </a:rPr>
+              <a:t>Websocket</a:t>
+            </a:r>
+            <a:r>
+              <a:rPr lang="ko-KR" altLang="en-US" sz="1400" dirty="0">
+                <a:solidFill>
+                  <a:srgbClr val="000000"/>
+                </a:solidFill>
+                <a:effectLst/>
+                <a:latin typeface="+mn-ea"/>
+              </a:rPr>
+              <a:t>과 </a:t>
+            </a:r>
+            <a:r>
+              <a:rPr lang="en-US" altLang="ko-KR" sz="1400" dirty="0">
+                <a:solidFill>
+                  <a:srgbClr val="000000"/>
+                </a:solidFill>
+                <a:effectLst/>
+                <a:latin typeface="+mn-ea"/>
+              </a:rPr>
+              <a:t>Redis</a:t>
+            </a:r>
+            <a:r>
+              <a:rPr lang="ko-KR" altLang="en-US" sz="1400" dirty="0">
+                <a:solidFill>
+                  <a:srgbClr val="000000"/>
+                </a:solidFill>
+                <a:effectLst/>
+                <a:latin typeface="+mn-ea"/>
+              </a:rPr>
+              <a:t>를 이용한 실시간 채팅 및 경매</a:t>
+            </a:r>
+          </a:p>
+          <a:p>
+            <a:r>
+              <a:rPr lang="en-US" altLang="ko-KR" sz="1400" dirty="0">
+                <a:solidFill>
+                  <a:srgbClr val="000000"/>
+                </a:solidFill>
+                <a:effectLst/>
+                <a:latin typeface="+mn-ea"/>
+              </a:rPr>
+              <a:t>- Docker</a:t>
+            </a:r>
+            <a:r>
+              <a:rPr lang="ko-KR" altLang="en-US" sz="1400" dirty="0">
+                <a:solidFill>
+                  <a:srgbClr val="000000"/>
+                </a:solidFill>
+                <a:effectLst/>
+                <a:latin typeface="+mn-ea"/>
+              </a:rPr>
+              <a:t>를 통한 서비스 배포</a:t>
+            </a:r>
+          </a:p>
+          <a:p>
+            <a:r>
+              <a:rPr lang="en-US" altLang="ko-KR" sz="1400" dirty="0">
+                <a:solidFill>
+                  <a:srgbClr val="000000"/>
+                </a:solidFill>
+                <a:effectLst/>
+                <a:latin typeface="+mn-ea"/>
+              </a:rPr>
+              <a:t>- Shell script</a:t>
+            </a:r>
+            <a:r>
+              <a:rPr lang="ko-KR" altLang="en-US" sz="1400" dirty="0">
+                <a:solidFill>
+                  <a:srgbClr val="000000"/>
+                </a:solidFill>
+                <a:effectLst/>
+                <a:latin typeface="+mn-ea"/>
+              </a:rPr>
+              <a:t>를 통한 배포 자동화</a:t>
+            </a:r>
+            <a:endParaRPr lang="en-US" altLang="ko-KR" sz="1400" dirty="0">
+              <a:latin typeface="+mn-ea"/>
+            </a:endParaRPr>
+          </a:p>
+        </p:txBody>
+      </p:sp>
     </p:spTree>
     <p:extLst>
       <p:ext uri="{BB962C8B-B14F-4D97-AF65-F5344CB8AC3E}">
@@ -5832,153 +6076,6 @@
       </p:sp>
       <p:sp>
         <p:nvSpPr>
-          <p:cNvPr id="2" name="모서리가 둥근 직사각형 1"/>
-          <p:cNvSpPr/>
-          <p:nvPr/>
-        </p:nvSpPr>
-        <p:spPr>
-          <a:xfrm>
-            <a:off x="1025235" y="2071254"/>
-            <a:ext cx="1884219" cy="429491"/>
-          </a:xfrm>
-          <a:prstGeom prst="roundRect">
-            <a:avLst/>
-          </a:prstGeom>
-          <a:solidFill>
-            <a:srgbClr val="00B050"/>
-          </a:solidFill>
-          <a:ln>
-            <a:noFill/>
-          </a:ln>
-        </p:spPr>
-        <p:style>
-          <a:lnRef idx="2">
-            <a:schemeClr val="accent1">
-              <a:shade val="50000"/>
-            </a:schemeClr>
-          </a:lnRef>
-          <a:fillRef idx="1">
-            <a:schemeClr val="accent1"/>
-          </a:fillRef>
-          <a:effectRef idx="0">
-            <a:schemeClr val="accent1"/>
-          </a:effectRef>
-          <a:fontRef idx="minor">
-            <a:schemeClr val="lt1"/>
-          </a:fontRef>
-        </p:style>
-        <p:txBody>
-          <a:bodyPr rtlCol="0" anchor="ctr"/>
-          <a:lstStyle/>
-          <a:p>
-            <a:pPr algn="ctr"/>
-            <a:r>
-              <a:rPr lang="ko-KR" altLang="en-US" sz="1600" b="1" dirty="0"/>
-              <a:t>프로젝트 주제</a:t>
-            </a:r>
-          </a:p>
-        </p:txBody>
-      </p:sp>
-      <p:sp>
-        <p:nvSpPr>
-          <p:cNvPr id="21" name="모서리가 둥근 직사각형 20"/>
-          <p:cNvSpPr/>
-          <p:nvPr/>
-        </p:nvSpPr>
-        <p:spPr>
-          <a:xfrm>
-            <a:off x="1025234" y="2989812"/>
-            <a:ext cx="1884219" cy="429491"/>
-          </a:xfrm>
-          <a:prstGeom prst="roundRect">
-            <a:avLst/>
-          </a:prstGeom>
-          <a:solidFill>
-            <a:srgbClr val="00B050"/>
-          </a:solidFill>
-          <a:ln>
-            <a:noFill/>
-          </a:ln>
-        </p:spPr>
-        <p:style>
-          <a:lnRef idx="2">
-            <a:schemeClr val="accent1">
-              <a:shade val="50000"/>
-            </a:schemeClr>
-          </a:lnRef>
-          <a:fillRef idx="1">
-            <a:schemeClr val="accent1"/>
-          </a:fillRef>
-          <a:effectRef idx="0">
-            <a:schemeClr val="accent1"/>
-          </a:effectRef>
-          <a:fontRef idx="minor">
-            <a:schemeClr val="lt1"/>
-          </a:fontRef>
-        </p:style>
-        <p:txBody>
-          <a:bodyPr rtlCol="0" anchor="ctr"/>
-          <a:lstStyle/>
-          <a:p>
-            <a:pPr algn="ctr"/>
-            <a:r>
-              <a:rPr lang="ko-KR" altLang="en-US" sz="1600" b="1" dirty="0"/>
-              <a:t>기획의도</a:t>
-            </a:r>
-          </a:p>
-        </p:txBody>
-      </p:sp>
-      <p:sp>
-        <p:nvSpPr>
-          <p:cNvPr id="40" name="모서리가 둥근 직사각형 39"/>
-          <p:cNvSpPr/>
-          <p:nvPr/>
-        </p:nvSpPr>
-        <p:spPr>
-          <a:xfrm>
-            <a:off x="1025235" y="4337862"/>
-            <a:ext cx="1884219" cy="429491"/>
-          </a:xfrm>
-          <a:prstGeom prst="roundRect">
-            <a:avLst/>
-          </a:prstGeom>
-          <a:solidFill>
-            <a:srgbClr val="00B050"/>
-          </a:solidFill>
-          <a:ln>
-            <a:noFill/>
-          </a:ln>
-        </p:spPr>
-        <p:style>
-          <a:lnRef idx="2">
-            <a:schemeClr val="accent1">
-              <a:shade val="50000"/>
-            </a:schemeClr>
-          </a:lnRef>
-          <a:fillRef idx="1">
-            <a:schemeClr val="accent1"/>
-          </a:fillRef>
-          <a:effectRef idx="0">
-            <a:schemeClr val="accent1"/>
-          </a:effectRef>
-          <a:fontRef idx="minor">
-            <a:schemeClr val="lt1"/>
-          </a:fontRef>
-        </p:style>
-        <p:txBody>
-          <a:bodyPr rtlCol="0" anchor="ctr"/>
-          <a:lstStyle/>
-          <a:p>
-            <a:pPr algn="ctr"/>
-            <a:r>
-              <a:rPr lang="ko-KR" altLang="en-US" sz="1600" b="1" dirty="0"/>
-              <a:t>세부 내용</a:t>
-            </a:r>
-          </a:p>
-        </p:txBody>
-      </p:sp>
-      <p:sp>
-        <p:nvSpPr>
           <p:cNvPr id="9" name="TextBox 8">
             <a:extLst>
               <a:ext uri="{FF2B5EF4-FFF2-40B4-BE49-F238E27FC236}">
@@ -6027,7 +6124,7 @@
         </p:nvSpPr>
         <p:spPr>
           <a:xfrm>
-            <a:off x="3117448" y="3019891"/>
+            <a:off x="3117448" y="3071420"/>
             <a:ext cx="3570208" cy="646331"/>
           </a:xfrm>
           <a:prstGeom prst="rect">
@@ -6082,8 +6179,8 @@
         </p:nvSpPr>
         <p:spPr>
           <a:xfrm>
-            <a:off x="3117447" y="4367941"/>
-            <a:ext cx="4012557" cy="923330"/>
+            <a:off x="3117447" y="4075144"/>
+            <a:ext cx="4012557" cy="646331"/>
           </a:xfrm>
           <a:prstGeom prst="rect">
             <a:avLst/>
@@ -6096,35 +6193,75 @@
           </a:bodyPr>
           <a:lstStyle/>
           <a:p>
-            <a:pPr marL="285750" indent="-285750">
-              <a:buFontTx/>
-              <a:buChar char="-"/>
-            </a:pPr>
-            <a:r>
-              <a:rPr lang="en-US" altLang="ko-KR" dirty="0"/>
-              <a:t>Spring + React Native</a:t>
-            </a:r>
-          </a:p>
-          <a:p>
-            <a:pPr marL="285750" indent="-285750">
-              <a:buFontTx/>
-              <a:buChar char="-"/>
-            </a:pPr>
-            <a:r>
-              <a:rPr lang="en-US" altLang="ko-KR" dirty="0" err="1"/>
-              <a:t>Tensorflow</a:t>
-            </a:r>
-            <a:endParaRPr lang="en-US" altLang="ko-KR" dirty="0"/>
-          </a:p>
-          <a:p>
-            <a:pPr marL="285750" indent="-285750">
-              <a:buFontTx/>
-              <a:buChar char="-"/>
-            </a:pPr>
-            <a:r>
-              <a:rPr lang="en-US" altLang="ko-KR" dirty="0"/>
-              <a:t>Docker Compose</a:t>
-            </a:r>
+            <a:r>
+              <a:rPr lang="ko-KR" altLang="en-US" dirty="0">
+                <a:solidFill>
+                  <a:srgbClr val="000000"/>
+                </a:solidFill>
+                <a:effectLst/>
+                <a:latin typeface="+mn-ea"/>
+              </a:rPr>
+              <a:t>소셜 로그인</a:t>
+            </a:r>
+            <a:r>
+              <a:rPr lang="en-US" altLang="ko-KR" dirty="0">
+                <a:solidFill>
+                  <a:srgbClr val="000000"/>
+                </a:solidFill>
+                <a:effectLst/>
+                <a:latin typeface="+mn-ea"/>
+              </a:rPr>
+              <a:t>, </a:t>
+            </a:r>
+            <a:r>
+              <a:rPr lang="ko-KR" altLang="en-US" dirty="0">
+                <a:solidFill>
+                  <a:srgbClr val="000000"/>
+                </a:solidFill>
+                <a:effectLst/>
+                <a:latin typeface="+mn-ea"/>
+              </a:rPr>
+              <a:t>랭킹 앱 개발</a:t>
+            </a:r>
+            <a:r>
+              <a:rPr lang="en-US" altLang="ko-KR" dirty="0">
+                <a:solidFill>
+                  <a:srgbClr val="000000"/>
+                </a:solidFill>
+                <a:effectLst/>
+                <a:latin typeface="+mn-ea"/>
+              </a:rPr>
+              <a:t>, </a:t>
+            </a:r>
+            <a:r>
+              <a:rPr lang="ko-KR" altLang="en-US" dirty="0">
+                <a:solidFill>
+                  <a:srgbClr val="000000"/>
+                </a:solidFill>
+                <a:effectLst/>
+                <a:latin typeface="+mn-ea"/>
+              </a:rPr>
+              <a:t>딥러닝 모델 설계</a:t>
+            </a:r>
+            <a:r>
+              <a:rPr lang="en-US" altLang="ko-KR" dirty="0">
+                <a:solidFill>
+                  <a:srgbClr val="000000"/>
+                </a:solidFill>
+                <a:effectLst/>
+                <a:latin typeface="+mn-ea"/>
+              </a:rPr>
+              <a:t>, DevOps</a:t>
+            </a:r>
+            <a:r>
+              <a:rPr lang="ko-KR" altLang="en-US" dirty="0">
+                <a:latin typeface="+mn-ea"/>
+              </a:rPr>
+              <a:t> </a:t>
+            </a:r>
+            <a:endParaRPr lang="en-US" altLang="ko-KR" dirty="0">
+              <a:latin typeface="+mn-ea"/>
+            </a:endParaRPr>
           </a:p>
         </p:txBody>
       </p:sp>
@@ -6201,7 +6338,7 @@
         </p:blipFill>
         <p:spPr>
           <a:xfrm>
-            <a:off x="7076969" y="4275096"/>
+            <a:off x="7533808" y="4275096"/>
             <a:ext cx="3960000" cy="2205641"/>
           </a:xfrm>
           <a:prstGeom prst="rect">
@@ -6236,7 +6373,7 @@
         </p:blipFill>
         <p:spPr>
           <a:xfrm>
-            <a:off x="7076969" y="1549980"/>
+            <a:off x="7533808" y="1549980"/>
             <a:ext cx="3960000" cy="2678693"/>
           </a:xfrm>
           <a:prstGeom prst="rect">
@@ -6244,6 +6381,406 @@
           </a:prstGeom>
         </p:spPr>
       </p:pic>
+      <p:sp>
+        <p:nvSpPr>
+          <p:cNvPr id="13" name="TextBox 12">
+            <a:extLst>
+              <a:ext uri="{FF2B5EF4-FFF2-40B4-BE49-F238E27FC236}">
+                <a16:creationId xmlns:a16="http://schemas.microsoft.com/office/drawing/2014/main" id="{EA101664-E190-40B6-8D5E-4EE2737FFC3B}"/>
+              </a:ext>
+            </a:extLst>
+          </p:cNvPr>
+          <p:cNvSpPr txBox="1"/>
+          <p:nvPr/>
+        </p:nvSpPr>
+        <p:spPr>
+          <a:xfrm>
+            <a:off x="3117447" y="5075022"/>
+            <a:ext cx="4278776" cy="1323439"/>
+          </a:xfrm>
+          <a:prstGeom prst="rect">
+            <a:avLst/>
+          </a:prstGeom>
+          <a:noFill/>
+        </p:spPr>
+        <p:txBody>
+          <a:bodyPr wrap="square" rtlCol="0">
+            <a:spAutoFit/>
+          </a:bodyPr>
+          <a:lstStyle/>
+          <a:p>
+            <a:r>
+              <a:rPr lang="en-US" altLang="ko-KR" sz="1600" dirty="0">
+                <a:solidFill>
+                  <a:srgbClr val="000000"/>
+                </a:solidFill>
+                <a:effectLst/>
+                <a:latin typeface="+mn-ea"/>
+              </a:rPr>
+              <a:t>- React Native </a:t>
+            </a:r>
+            <a:r>
+              <a:rPr lang="ko-KR" altLang="en-US" sz="1600" dirty="0">
+                <a:solidFill>
+                  <a:srgbClr val="000000"/>
+                </a:solidFill>
+                <a:effectLst/>
+                <a:latin typeface="+mn-ea"/>
+              </a:rPr>
+              <a:t>카카오 로그인 기능 구현</a:t>
+            </a:r>
+          </a:p>
+          <a:p>
+            <a:r>
+              <a:rPr lang="en-US" altLang="ko-KR" sz="1600" dirty="0">
+                <a:solidFill>
+                  <a:srgbClr val="000000"/>
+                </a:solidFill>
+                <a:effectLst/>
+                <a:latin typeface="+mn-ea"/>
+              </a:rPr>
+              <a:t>- </a:t>
+            </a:r>
+            <a:r>
+              <a:rPr lang="ko-KR" altLang="en-US" sz="1600" dirty="0">
+                <a:solidFill>
+                  <a:srgbClr val="000000"/>
+                </a:solidFill>
+                <a:effectLst/>
+                <a:latin typeface="+mn-ea"/>
+              </a:rPr>
+              <a:t>랭킹 </a:t>
+            </a:r>
+            <a:r>
+              <a:rPr lang="en-US" altLang="ko-KR" sz="1600" dirty="0">
+                <a:solidFill>
+                  <a:srgbClr val="000000"/>
+                </a:solidFill>
+                <a:effectLst/>
+                <a:latin typeface="+mn-ea"/>
+              </a:rPr>
+              <a:t>REST API </a:t>
+            </a:r>
+            <a:r>
+              <a:rPr lang="ko-KR" altLang="en-US" sz="1600" dirty="0">
+                <a:solidFill>
+                  <a:srgbClr val="000000"/>
+                </a:solidFill>
+                <a:effectLst/>
+                <a:latin typeface="+mn-ea"/>
+              </a:rPr>
+              <a:t>구현 및 앱 레이아웃 구성</a:t>
+            </a:r>
+          </a:p>
+          <a:p>
+            <a:r>
+              <a:rPr lang="en-US" altLang="ko-KR" sz="1600" dirty="0">
+                <a:solidFill>
+                  <a:srgbClr val="000000"/>
+                </a:solidFill>
+                <a:effectLst/>
+                <a:latin typeface="+mn-ea"/>
+              </a:rPr>
+              <a:t>- </a:t>
+            </a:r>
+            <a:r>
+              <a:rPr lang="ko-KR" altLang="en-US" sz="1600" dirty="0">
+                <a:solidFill>
+                  <a:srgbClr val="000000"/>
+                </a:solidFill>
+                <a:effectLst/>
+                <a:latin typeface="+mn-ea"/>
+              </a:rPr>
+              <a:t>물고기 이미지 분류 </a:t>
+            </a:r>
+            <a:r>
+              <a:rPr lang="en-US" altLang="ko-KR" sz="1600" dirty="0">
+                <a:solidFill>
+                  <a:srgbClr val="000000"/>
+                </a:solidFill>
+                <a:effectLst/>
+                <a:latin typeface="+mn-ea"/>
+              </a:rPr>
+              <a:t>CNN </a:t>
+            </a:r>
+            <a:r>
+              <a:rPr lang="ko-KR" altLang="en-US" sz="1600" dirty="0">
+                <a:solidFill>
+                  <a:srgbClr val="000000"/>
+                </a:solidFill>
+                <a:effectLst/>
+                <a:latin typeface="+mn-ea"/>
+              </a:rPr>
+              <a:t>모델 설계</a:t>
+            </a:r>
+            <a:r>
+              <a:rPr lang="en-US" altLang="ko-KR" sz="1600" dirty="0">
+                <a:solidFill>
+                  <a:srgbClr val="000000"/>
+                </a:solidFill>
+                <a:effectLst/>
+                <a:latin typeface="+mn-ea"/>
+              </a:rPr>
+              <a:t>(TF)</a:t>
+            </a:r>
+            <a:endParaRPr lang="ko-KR" altLang="en-US" sz="1600" dirty="0">
+              <a:solidFill>
+                <a:srgbClr val="000000"/>
+              </a:solidFill>
+              <a:effectLst/>
+              <a:latin typeface="+mn-ea"/>
+            </a:endParaRPr>
+          </a:p>
+          <a:p>
+            <a:r>
+              <a:rPr lang="en-US" altLang="ko-KR" sz="1600" dirty="0">
+                <a:solidFill>
+                  <a:srgbClr val="000000"/>
+                </a:solidFill>
+                <a:effectLst/>
+                <a:latin typeface="+mn-ea"/>
+              </a:rPr>
+              <a:t>- Docker compose </a:t>
+            </a:r>
+            <a:r>
+              <a:rPr lang="ko-KR" altLang="en-US" sz="1600" dirty="0">
+                <a:solidFill>
+                  <a:srgbClr val="000000"/>
+                </a:solidFill>
+                <a:effectLst/>
+                <a:latin typeface="+mn-ea"/>
+              </a:rPr>
+              <a:t>구성을 통한 서비스 배포</a:t>
+            </a:r>
+            <a:endParaRPr lang="en-US" altLang="ko-KR" sz="1600" dirty="0">
+              <a:latin typeface="+mn-ea"/>
+            </a:endParaRPr>
+          </a:p>
+          <a:p>
+            <a:endParaRPr lang="en-US" altLang="ko-KR" sz="1600" dirty="0"/>
+          </a:p>
+        </p:txBody>
+      </p:sp>
+      <p:sp>
+        <p:nvSpPr>
+          <p:cNvPr id="17" name="모서리가 둥근 직사각형 1">
+            <a:extLst>
+              <a:ext uri="{FF2B5EF4-FFF2-40B4-BE49-F238E27FC236}">
+                <a16:creationId xmlns:a16="http://schemas.microsoft.com/office/drawing/2014/main" id="{81D8B22E-DBE3-44C7-B086-B91C8F258A02}"/>
+              </a:ext>
+            </a:extLst>
+          </p:cNvPr>
+          <p:cNvSpPr/>
+          <p:nvPr/>
+        </p:nvSpPr>
+        <p:spPr>
+          <a:xfrm>
+            <a:off x="1025235" y="2071254"/>
+            <a:ext cx="1884219" cy="429491"/>
+          </a:xfrm>
+          <a:prstGeom prst="roundRect">
+            <a:avLst/>
+          </a:prstGeom>
+          <a:solidFill>
+            <a:srgbClr val="00B050"/>
+          </a:solidFill>
+          <a:ln>
+            <a:noFill/>
+          </a:ln>
+        </p:spPr>
+        <p:style>
+          <a:lnRef idx="2">
+            <a:schemeClr val="accent1">
+              <a:shade val="50000"/>
+            </a:schemeClr>
+          </a:lnRef>
+          <a:fillRef idx="1">
+            <a:schemeClr val="accent1"/>
+          </a:fillRef>
+          <a:effectRef idx="0">
+            <a:schemeClr val="accent1"/>
+          </a:effectRef>
+          <a:fontRef idx="minor">
+            <a:schemeClr val="lt1"/>
+          </a:fontRef>
+        </p:style>
+        <p:txBody>
+          <a:bodyPr rtlCol="0" anchor="ctr"/>
+          <a:lstStyle/>
+          <a:p>
+            <a:pPr algn="ctr"/>
+            <a:r>
+              <a:rPr lang="ko-KR" altLang="en-US" sz="1600" b="1" dirty="0"/>
+              <a:t>프로젝트 주제</a:t>
+            </a:r>
+          </a:p>
+        </p:txBody>
+      </p:sp>
+      <p:sp>
+        <p:nvSpPr>
+          <p:cNvPr id="18" name="모서리가 둥근 직사각형 20">
+            <a:extLst>
+              <a:ext uri="{FF2B5EF4-FFF2-40B4-BE49-F238E27FC236}">
+                <a16:creationId xmlns:a16="http://schemas.microsoft.com/office/drawing/2014/main" id="{6DE919DC-B2D0-49C9-B42D-6919F1B24CC0}"/>
+              </a:ext>
+            </a:extLst>
+          </p:cNvPr>
+          <p:cNvSpPr/>
+          <p:nvPr/>
+        </p:nvSpPr>
+        <p:spPr>
+          <a:xfrm>
+            <a:off x="1025234" y="3071420"/>
+            <a:ext cx="1884219" cy="429491"/>
+          </a:xfrm>
+          <a:prstGeom prst="roundRect">
+            <a:avLst/>
+          </a:prstGeom>
+          <a:solidFill>
+            <a:srgbClr val="00B050"/>
+          </a:solidFill>
+          <a:ln>
+            <a:noFill/>
+          </a:ln>
+        </p:spPr>
+        <p:style>
+          <a:lnRef idx="2">
+            <a:schemeClr val="accent1">
+              <a:shade val="50000"/>
+            </a:schemeClr>
+          </a:lnRef>
+          <a:fillRef idx="1">
+            <a:schemeClr val="accent1"/>
+          </a:fillRef>
+          <a:effectRef idx="0">
+            <a:schemeClr val="accent1"/>
+          </a:effectRef>
+          <a:fontRef idx="minor">
+            <a:schemeClr val="lt1"/>
+          </a:fontRef>
+        </p:style>
+        <p:txBody>
+          <a:bodyPr rtlCol="0" anchor="ctr"/>
+          <a:lstStyle/>
+          <a:p>
+            <a:pPr algn="ctr"/>
+            <a:r>
+              <a:rPr lang="ko-KR" altLang="en-US" sz="1600" b="1" dirty="0"/>
+              <a:t>기획의도</a:t>
+            </a:r>
+          </a:p>
+        </p:txBody>
+      </p:sp>
+      <p:sp>
+        <p:nvSpPr>
+          <p:cNvPr id="19" name="모서리가 둥근 직사각형 39">
+            <a:extLst>
+              <a:ext uri="{FF2B5EF4-FFF2-40B4-BE49-F238E27FC236}">
+                <a16:creationId xmlns:a16="http://schemas.microsoft.com/office/drawing/2014/main" id="{2261D6D2-98BD-461A-BB68-81A25FC581ED}"/>
+              </a:ext>
+            </a:extLst>
+          </p:cNvPr>
+          <p:cNvSpPr/>
+          <p:nvPr/>
+        </p:nvSpPr>
+        <p:spPr>
+          <a:xfrm>
+            <a:off x="1025235" y="4071586"/>
+            <a:ext cx="1884219" cy="429491"/>
+          </a:xfrm>
+          <a:prstGeom prst="roundRect">
+            <a:avLst/>
+          </a:prstGeom>
+          <a:solidFill>
+            <a:srgbClr val="00B050"/>
+          </a:solidFill>
+          <a:ln>
+            <a:noFill/>
+          </a:ln>
+        </p:spPr>
+        <p:style>
+          <a:lnRef idx="2">
+            <a:schemeClr val="accent1">
+              <a:shade val="50000"/>
+            </a:schemeClr>
+          </a:lnRef>
+          <a:fillRef idx="1">
+            <a:schemeClr val="accent1"/>
+          </a:fillRef>
+          <a:effectRef idx="0">
+            <a:schemeClr val="accent1"/>
+          </a:effectRef>
+          <a:fontRef idx="minor">
+            <a:schemeClr val="lt1"/>
+          </a:fontRef>
+        </p:style>
+        <p:txBody>
+          <a:bodyPr rtlCol="0" anchor="ctr"/>
+          <a:lstStyle/>
+          <a:p>
+            <a:pPr algn="ctr"/>
+            <a:r>
+              <a:rPr lang="ko-KR" altLang="en-US" sz="1600" b="1" dirty="0"/>
+              <a:t>담당 역할</a:t>
+            </a:r>
+          </a:p>
+        </p:txBody>
+      </p:sp>
+      <p:sp>
+        <p:nvSpPr>
+          <p:cNvPr id="20" name="모서리가 둥근 직사각형 39">
+            <a:extLst>
+              <a:ext uri="{FF2B5EF4-FFF2-40B4-BE49-F238E27FC236}">
+                <a16:creationId xmlns:a16="http://schemas.microsoft.com/office/drawing/2014/main" id="{56919492-64F0-4315-BA98-1296AAFAD2ED}"/>
+              </a:ext>
+            </a:extLst>
+          </p:cNvPr>
+          <p:cNvSpPr/>
+          <p:nvPr/>
+        </p:nvSpPr>
+        <p:spPr>
+          <a:xfrm>
+            <a:off x="1025235" y="5071753"/>
+            <a:ext cx="1884219" cy="429491"/>
+          </a:xfrm>
+          <a:prstGeom prst="roundRect">
+            <a:avLst/>
+          </a:prstGeom>
+          <a:solidFill>
+            <a:srgbClr val="00B050"/>
+          </a:solidFill>
+          <a:ln>
+            <a:noFill/>
+          </a:ln>
+        </p:spPr>
+        <p:style>
+          <a:lnRef idx="2">
+            <a:schemeClr val="accent1">
+              <a:shade val="50000"/>
+            </a:schemeClr>
+          </a:lnRef>
+          <a:fillRef idx="1">
+            <a:schemeClr val="accent1"/>
+          </a:fillRef>
+          <a:effectRef idx="0">
+            <a:schemeClr val="accent1"/>
+          </a:effectRef>
+          <a:fontRef idx="minor">
+            <a:schemeClr val="lt1"/>
+          </a:fontRef>
+        </p:style>
+        <p:txBody>
+          <a:bodyPr rtlCol="0" anchor="ctr"/>
+          <a:lstStyle/>
+          <a:p>
+            <a:pPr algn="ctr"/>
+            <a:r>
+              <a:rPr lang="ko-KR" altLang="en-US" sz="1600" b="1" dirty="0"/>
+              <a:t>개발 내용</a:t>
+            </a:r>
+          </a:p>
+        </p:txBody>
+      </p:sp>
     </p:spTree>
     <p:extLst>
       <p:ext uri="{BB962C8B-B14F-4D97-AF65-F5344CB8AC3E}">

</xml_diff>